<commit_message>
Fix syntax in Match example
</commit_message>
<xml_diff>
--- a/react-router-meetup.pptx
+++ b/react-router-meetup.pptx
@@ -279,7 +279,7 @@
           <a:p>
             <a:fld id="{963854BB-5908-0843-BA41-B7E7E599A04D}" type="datetimeFigureOut">
               <a:rPr lang="de-DE" smtClean="0"/>
-              <a:t>21.11.16</a:t>
+              <a:t>23.11.16</a:t>
             </a:fld>
             <a:endParaRPr lang="de-DE"/>
           </a:p>
@@ -4066,7 +4066,7 @@
           <a:p>
             <a:fld id="{C764DE79-268F-4C1A-8933-263129D2AF90}" type="datetimeFigureOut">
               <a:rPr lang="en-US" dirty="0"/>
-              <a:t>11/21/16</a:t>
+              <a:t>11/23/16</a:t>
             </a:fld>
             <a:endParaRPr lang="en-US" dirty="0"/>
           </a:p>
@@ -6086,7 +6086,29 @@
                 <a:ea typeface="Source Code Pro Medium" charset="0"/>
                 <a:cs typeface="Source Code Pro Medium" charset="0"/>
               </a:rPr>
-              <a:t>={ &lt;Welcome /&gt; } </a:t>
+              <a:t>={ </a:t>
+            </a:r>
+            <a:r>
+              <a:rPr lang="de-DE" sz="1950" dirty="0" smtClean="0">
+                <a:solidFill>
+                  <a:srgbClr val="EF7D1D"/>
+                </a:solidFill>
+                <a:latin typeface="Source Code Pro Medium" charset="0"/>
+                <a:ea typeface="Source Code Pro Medium" charset="0"/>
+                <a:cs typeface="Source Code Pro Medium" charset="0"/>
+              </a:rPr>
+              <a:t>Welcome </a:t>
+            </a:r>
+            <a:r>
+              <a:rPr lang="de-DE" sz="1950" dirty="0" smtClean="0">
+                <a:solidFill>
+                  <a:srgbClr val="EF7D1D"/>
+                </a:solidFill>
+                <a:latin typeface="Source Code Pro Medium" charset="0"/>
+                <a:ea typeface="Source Code Pro Medium" charset="0"/>
+                <a:cs typeface="Source Code Pro Medium" charset="0"/>
+              </a:rPr>
+              <a:t>} </a:t>
             </a:r>
             <a:r>
               <a:rPr lang="de-DE" sz="1950" dirty="0">
@@ -6242,7 +6264,7 @@
                 <a:ea typeface="Source Code Pro Medium" charset="0"/>
                 <a:cs typeface="Source Code Pro Medium" charset="0"/>
               </a:rPr>
-              <a:t>={ &lt;</a:t>
+              <a:t>={ </a:t>
             </a:r>
             <a:r>
               <a:rPr lang="de-DE" sz="1950" dirty="0" err="1" smtClean="0">
@@ -6264,7 +6286,18 @@
                 <a:ea typeface="Source Code Pro Medium" charset="0"/>
                 <a:cs typeface="Source Code Pro Medium" charset="0"/>
               </a:rPr>
-              <a:t>/&gt; } /&gt;</a:t>
+              <a:t> </a:t>
+            </a:r>
+            <a:r>
+              <a:rPr lang="de-DE" sz="1950" dirty="0" smtClean="0">
+                <a:solidFill>
+                  <a:srgbClr val="EF7D1D"/>
+                </a:solidFill>
+                <a:latin typeface="Source Code Pro Medium" charset="0"/>
+                <a:ea typeface="Source Code Pro Medium" charset="0"/>
+                <a:cs typeface="Source Code Pro Medium" charset="0"/>
+              </a:rPr>
+              <a:t>} /&gt;</a:t>
             </a:r>
           </a:p>
           <a:p>
@@ -6365,7 +6398,18 @@
                 <a:ea typeface="Source Code Pro Medium" charset="0"/>
                 <a:cs typeface="Source Code Pro Medium" charset="0"/>
               </a:rPr>
-              <a:t>={ &lt;Secret /&gt; } /&gt;</a:t>
+              <a:t>={ Secret </a:t>
+            </a:r>
+            <a:r>
+              <a:rPr lang="de-DE" sz="1950" dirty="0" smtClean="0">
+                <a:solidFill>
+                  <a:srgbClr val="EF7D1D"/>
+                </a:solidFill>
+                <a:latin typeface="Source Code Pro Medium" charset="0"/>
+                <a:ea typeface="Source Code Pro Medium" charset="0"/>
+                <a:cs typeface="Source Code Pro Medium" charset="0"/>
+              </a:rPr>
+              <a:t>} /&gt;</a:t>
             </a:r>
           </a:p>
           <a:p>
@@ -27055,14 +27099,6 @@
               </a:rPr>
               <a:t> &lt;/div&gt;</a:t>
             </a:r>
-            <a:endParaRPr lang="de-DE" sz="1950" dirty="0" smtClean="0">
-              <a:solidFill>
-                <a:srgbClr val="025249"/>
-              </a:solidFill>
-              <a:latin typeface="Source Code Pro Medium" charset="0"/>
-              <a:ea typeface="Source Code Pro Medium" charset="0"/>
-              <a:cs typeface="Source Code Pro Medium" charset="0"/>
-            </a:endParaRPr>
           </a:p>
           <a:p>
             <a:r>
@@ -27076,14 +27112,6 @@
               </a:rPr>
               <a:t>);</a:t>
             </a:r>
-            <a:endParaRPr lang="de-DE" sz="1950" dirty="0" smtClean="0">
-              <a:solidFill>
-                <a:srgbClr val="025249"/>
-              </a:solidFill>
-              <a:latin typeface="Source Code Pro Medium" charset="0"/>
-              <a:ea typeface="Source Code Pro Medium" charset="0"/>
-              <a:cs typeface="Source Code Pro Medium" charset="0"/>
-            </a:endParaRPr>
           </a:p>
           <a:p>
             <a:endParaRPr lang="de-DE" sz="1950" dirty="0">
@@ -27129,14 +27157,6 @@
               </a:rPr>
               <a:t>Links</a:t>
             </a:r>
-            <a:endParaRPr lang="de-DE" sz="2800" b="1" dirty="0" smtClean="0">
-              <a:solidFill>
-                <a:srgbClr val="EF7D1D"/>
-              </a:solidFill>
-              <a:latin typeface="Source Sans Pro Semibold" charset="0"/>
-              <a:ea typeface="Source Sans Pro Semibold" charset="0"/>
-              <a:cs typeface="Source Sans Pro Semibold" charset="0"/>
-            </a:endParaRPr>
           </a:p>
         </p:txBody>
       </p:sp>

</xml_diff>